<commit_message>
documento e slides okay
</commit_message>
<xml_diff>
--- a/TCC - Documento/TCC II.pptx
+++ b/TCC - Documento/TCC II.pptx
@@ -250,7 +250,7 @@
           <a:p>
             <a:fld id="{1B59BDBE-59CB-4EDC-B99C-C69B3C658301}" type="datetimeFigureOut">
               <a:rPr lang="pt-BR" smtClean="0"/>
-              <a:t>21/04/2016</a:t>
+              <a:t>22/04/2016</a:t>
             </a:fld>
             <a:endParaRPr lang="pt-BR"/>
           </a:p>
@@ -857,7 +857,7 @@
           <a:p>
             <a:fld id="{775D8B99-A17D-4E1D-BB0B-67D1381AC551}" type="datetime1">
               <a:rPr lang="pt-BR" smtClean="0"/>
-              <a:t>21/04/2016</a:t>
+              <a:t>22/04/2016</a:t>
             </a:fld>
             <a:endParaRPr lang="pt-BR"/>
           </a:p>
@@ -1026,7 +1026,7 @@
           <a:p>
             <a:fld id="{775D8B99-A17D-4E1D-BB0B-67D1381AC551}" type="datetime1">
               <a:rPr lang="pt-BR" smtClean="0"/>
-              <a:t>21/04/2016</a:t>
+              <a:t>22/04/2016</a:t>
             </a:fld>
             <a:endParaRPr lang="pt-BR"/>
           </a:p>
@@ -1205,7 +1205,7 @@
           <a:p>
             <a:fld id="{775D8B99-A17D-4E1D-BB0B-67D1381AC551}" type="datetime1">
               <a:rPr lang="pt-BR" smtClean="0"/>
-              <a:t>21/04/2016</a:t>
+              <a:t>22/04/2016</a:t>
             </a:fld>
             <a:endParaRPr lang="pt-BR"/>
           </a:p>
@@ -1374,7 +1374,7 @@
           <a:p>
             <a:fld id="{775D8B99-A17D-4E1D-BB0B-67D1381AC551}" type="datetime1">
               <a:rPr lang="pt-BR" smtClean="0"/>
-              <a:t>21/04/2016</a:t>
+              <a:t>22/04/2016</a:t>
             </a:fld>
             <a:endParaRPr lang="pt-BR"/>
           </a:p>
@@ -1620,7 +1620,7 @@
           <a:p>
             <a:fld id="{7A316752-3A49-4DED-A458-533FF250ADCD}" type="datetime1">
               <a:rPr lang="pt-BR" smtClean="0"/>
-              <a:t>21/04/2016</a:t>
+              <a:t>22/04/2016</a:t>
             </a:fld>
             <a:endParaRPr lang="pt-BR"/>
           </a:p>
@@ -1861,7 +1861,7 @@
           <a:p>
             <a:fld id="{3103DA00-4E86-479F-9465-756E750E2C7A}" type="datetime1">
               <a:rPr lang="pt-BR" smtClean="0"/>
-              <a:t>21/04/2016</a:t>
+              <a:t>22/04/2016</a:t>
             </a:fld>
             <a:endParaRPr lang="pt-BR"/>
           </a:p>
@@ -2237,7 +2237,7 @@
           <a:p>
             <a:fld id="{8A9CFFEF-7C51-4A89-B41D-DB87D80AB99C}" type="datetime1">
               <a:rPr lang="pt-BR" smtClean="0"/>
-              <a:t>21/04/2016</a:t>
+              <a:t>22/04/2016</a:t>
             </a:fld>
             <a:endParaRPr lang="pt-BR"/>
           </a:p>
@@ -2366,7 +2366,7 @@
           <a:p>
             <a:fld id="{775D8B99-A17D-4E1D-BB0B-67D1381AC551}" type="datetime1">
               <a:rPr lang="pt-BR" smtClean="0"/>
-              <a:t>21/04/2016</a:t>
+              <a:t>22/04/2016</a:t>
             </a:fld>
             <a:endParaRPr lang="pt-BR"/>
           </a:p>
@@ -2462,7 +2462,7 @@
           <a:p>
             <a:fld id="{82DBB31F-1CF9-4A63-87FE-A0BE9289F539}" type="datetime1">
               <a:rPr lang="pt-BR" smtClean="0"/>
-              <a:t>21/04/2016</a:t>
+              <a:t>22/04/2016</a:t>
             </a:fld>
             <a:endParaRPr lang="pt-BR"/>
           </a:p>
@@ -2749,7 +2749,7 @@
           <a:p>
             <a:fld id="{E3047AFD-A5E2-4174-BC85-B3C41449EF2B}" type="datetime1">
               <a:rPr lang="pt-BR" smtClean="0"/>
-              <a:t>21/04/2016</a:t>
+              <a:t>22/04/2016</a:t>
             </a:fld>
             <a:endParaRPr lang="pt-BR"/>
           </a:p>
@@ -3013,7 +3013,7 @@
           <a:p>
             <a:fld id="{3DCB0219-104B-453B-9627-7BD4B22A4025}" type="datetime1">
               <a:rPr lang="pt-BR" smtClean="0"/>
-              <a:t>21/04/2016</a:t>
+              <a:t>22/04/2016</a:t>
             </a:fld>
             <a:endParaRPr lang="pt-BR"/>
           </a:p>
@@ -3236,7 +3236,7 @@
           <a:p>
             <a:fld id="{775D8B99-A17D-4E1D-BB0B-67D1381AC551}" type="datetime1">
               <a:rPr lang="pt-BR" smtClean="0"/>
-              <a:t>21/04/2016</a:t>
+              <a:t>22/04/2016</a:t>
             </a:fld>
             <a:endParaRPr lang="pt-BR"/>
           </a:p>
@@ -10621,8 +10621,8 @@
         </p:blipFill>
         <p:spPr>
           <a:xfrm>
-            <a:off x="727927" y="1930400"/>
-            <a:ext cx="7787423" cy="3658943"/>
+            <a:off x="727927" y="1931396"/>
+            <a:ext cx="7787423" cy="3656951"/>
           </a:xfrm>
         </p:spPr>
       </p:pic>

</xml_diff>